<commit_message>
Air PACA - AtmoSud
</commit_message>
<xml_diff>
--- a/img/contributors.pptx
+++ b/img/contributors.pptx
@@ -288,7 +288,7 @@
           <a:p>
             <a:fld id="{B27562E8-06CF-4E60-8766-CA1CD94B21AB}" type="datetimeFigureOut">
               <a:rPr lang="fr-FR" smtClean="0"/>
-              <a:t>26/09/2017</a:t>
+              <a:t>11/07/2018</a:t>
             </a:fld>
             <a:endParaRPr lang="fr-FR"/>
           </a:p>
@@ -458,7 +458,7 @@
           <a:p>
             <a:fld id="{B27562E8-06CF-4E60-8766-CA1CD94B21AB}" type="datetimeFigureOut">
               <a:rPr lang="fr-FR" smtClean="0"/>
-              <a:t>26/09/2017</a:t>
+              <a:t>11/07/2018</a:t>
             </a:fld>
             <a:endParaRPr lang="fr-FR"/>
           </a:p>
@@ -638,7 +638,7 @@
           <a:p>
             <a:fld id="{B27562E8-06CF-4E60-8766-CA1CD94B21AB}" type="datetimeFigureOut">
               <a:rPr lang="fr-FR" smtClean="0"/>
-              <a:t>26/09/2017</a:t>
+              <a:t>11/07/2018</a:t>
             </a:fld>
             <a:endParaRPr lang="fr-FR"/>
           </a:p>
@@ -808,7 +808,7 @@
           <a:p>
             <a:fld id="{B27562E8-06CF-4E60-8766-CA1CD94B21AB}" type="datetimeFigureOut">
               <a:rPr lang="fr-FR" smtClean="0"/>
-              <a:t>26/09/2017</a:t>
+              <a:t>11/07/2018</a:t>
             </a:fld>
             <a:endParaRPr lang="fr-FR"/>
           </a:p>
@@ -1054,7 +1054,7 @@
           <a:p>
             <a:fld id="{B27562E8-06CF-4E60-8766-CA1CD94B21AB}" type="datetimeFigureOut">
               <a:rPr lang="fr-FR" smtClean="0"/>
-              <a:t>26/09/2017</a:t>
+              <a:t>11/07/2018</a:t>
             </a:fld>
             <a:endParaRPr lang="fr-FR"/>
           </a:p>
@@ -1342,7 +1342,7 @@
           <a:p>
             <a:fld id="{B27562E8-06CF-4E60-8766-CA1CD94B21AB}" type="datetimeFigureOut">
               <a:rPr lang="fr-FR" smtClean="0"/>
-              <a:t>26/09/2017</a:t>
+              <a:t>11/07/2018</a:t>
             </a:fld>
             <a:endParaRPr lang="fr-FR"/>
           </a:p>
@@ -1764,7 +1764,7 @@
           <a:p>
             <a:fld id="{B27562E8-06CF-4E60-8766-CA1CD94B21AB}" type="datetimeFigureOut">
               <a:rPr lang="fr-FR" smtClean="0"/>
-              <a:t>26/09/2017</a:t>
+              <a:t>11/07/2018</a:t>
             </a:fld>
             <a:endParaRPr lang="fr-FR"/>
           </a:p>
@@ -1882,7 +1882,7 @@
           <a:p>
             <a:fld id="{B27562E8-06CF-4E60-8766-CA1CD94B21AB}" type="datetimeFigureOut">
               <a:rPr lang="fr-FR" smtClean="0"/>
-              <a:t>26/09/2017</a:t>
+              <a:t>11/07/2018</a:t>
             </a:fld>
             <a:endParaRPr lang="fr-FR"/>
           </a:p>
@@ -1977,7 +1977,7 @@
           <a:p>
             <a:fld id="{B27562E8-06CF-4E60-8766-CA1CD94B21AB}" type="datetimeFigureOut">
               <a:rPr lang="fr-FR" smtClean="0"/>
-              <a:t>26/09/2017</a:t>
+              <a:t>11/07/2018</a:t>
             </a:fld>
             <a:endParaRPr lang="fr-FR"/>
           </a:p>
@@ -2254,7 +2254,7 @@
           <a:p>
             <a:fld id="{B27562E8-06CF-4E60-8766-CA1CD94B21AB}" type="datetimeFigureOut">
               <a:rPr lang="fr-FR" smtClean="0"/>
-              <a:t>26/09/2017</a:t>
+              <a:t>11/07/2018</a:t>
             </a:fld>
             <a:endParaRPr lang="fr-FR"/>
           </a:p>
@@ -2507,7 +2507,7 @@
           <a:p>
             <a:fld id="{B27562E8-06CF-4E60-8766-CA1CD94B21AB}" type="datetimeFigureOut">
               <a:rPr lang="fr-FR" smtClean="0"/>
-              <a:t>26/09/2017</a:t>
+              <a:t>11/07/2018</a:t>
             </a:fld>
             <a:endParaRPr lang="fr-FR"/>
           </a:p>
@@ -2720,7 +2720,7 @@
           <a:p>
             <a:fld id="{B27562E8-06CF-4E60-8766-CA1CD94B21AB}" type="datetimeFigureOut">
               <a:rPr lang="fr-FR" smtClean="0"/>
-              <a:t>26/09/2017</a:t>
+              <a:t>11/07/2018</a:t>
             </a:fld>
             <a:endParaRPr lang="fr-FR"/>
           </a:p>
@@ -3261,47 +3261,6 @@
       </p:pic>
       <p:pic>
         <p:nvPicPr>
-          <p:cNvPr id="6" name="Picture 2" descr="C:\Users\rs\Desktop\logo_airpaca.png"/>
-          <p:cNvPicPr>
-            <a:picLocks noChangeAspect="1" noChangeArrowheads="1"/>
-          </p:cNvPicPr>
-          <p:nvPr/>
-        </p:nvPicPr>
-        <p:blipFill>
-          <a:blip r:embed="rId2">
-            <a:extLst>
-              <a:ext uri="{28A0092B-C50C-407E-A947-70E740481C1C}">
-                <a14:useLocalDpi xmlns:a14="http://schemas.microsoft.com/office/drawing/2010/main" val="0"/>
-              </a:ext>
-            </a:extLst>
-          </a:blip>
-          <a:srcRect/>
-          <a:stretch>
-            <a:fillRect/>
-          </a:stretch>
-        </p:blipFill>
-        <p:spPr bwMode="auto">
-          <a:xfrm>
-            <a:off x="4364722" y="3429000"/>
-            <a:ext cx="2087869" cy="797488"/>
-          </a:xfrm>
-          <a:prstGeom prst="rect">
-            <a:avLst/>
-          </a:prstGeom>
-          <a:noFill/>
-          <a:extLst>
-            <a:ext uri="{909E8E84-426E-40DD-AFC4-6F175D3DCCD1}">
-              <a14:hiddenFill xmlns:a14="http://schemas.microsoft.com/office/drawing/2010/main">
-                <a:solidFill>
-                  <a:srgbClr val="FFFFFF"/>
-                </a:solidFill>
-              </a14:hiddenFill>
-            </a:ext>
-          </a:extLst>
-        </p:spPr>
-      </p:pic>
-      <p:pic>
-        <p:nvPicPr>
           <p:cNvPr id="8" name="Picture 4" descr="C:\Users\rs\Desktop\Logo ORECA.png"/>
           <p:cNvPicPr>
             <a:picLocks noChangeAspect="1" noChangeArrowheads="1"/>
@@ -3371,6 +3330,48 @@
             <a:avLst/>
           </a:prstGeom>
           <a:noFill/>
+          <a:extLst>
+            <a:ext uri="{909E8E84-426E-40DD-AFC4-6F175D3DCCD1}">
+              <a14:hiddenFill xmlns:a14="http://schemas.microsoft.com/office/drawing/2010/main">
+                <a:solidFill>
+                  <a:srgbClr val="FFFFFF"/>
+                </a:solidFill>
+              </a14:hiddenFill>
+            </a:ext>
+          </a:extLst>
+        </p:spPr>
+      </p:pic>
+      <p:pic>
+        <p:nvPicPr>
+          <p:cNvPr id="2" name="Picture 2" descr="X:\LOGOTHEQUE\LOGOS_ATMOSUD\LOGO ATMOSUD WEB\LOGO ATMOSUD_RVB_WEB.png"/>
+          <p:cNvPicPr>
+            <a:picLocks noChangeAspect="1" noChangeArrowheads="1"/>
+          </p:cNvPicPr>
+          <p:nvPr/>
+        </p:nvPicPr>
+        <p:blipFill rotWithShape="1">
+          <a:blip r:embed="rId7" cstate="print">
+            <a:extLst>
+              <a:ext uri="{28A0092B-C50C-407E-A947-70E740481C1C}">
+                <a14:useLocalDpi xmlns:a14="http://schemas.microsoft.com/office/drawing/2010/main" val="0"/>
+              </a:ext>
+            </a:extLst>
+          </a:blip>
+          <a:srcRect t="6783" b="8164"/>
+          <a:stretch/>
+        </p:blipFill>
+        <p:spPr bwMode="auto">
+          <a:xfrm>
+            <a:off x="4363596" y="3429000"/>
+            <a:ext cx="2090355" cy="845820"/>
+          </a:xfrm>
+          <a:prstGeom prst="rect">
+            <a:avLst/>
+          </a:prstGeom>
+          <a:noFill/>
+          <a:ln>
+            <a:noFill/>
+          </a:ln>
           <a:extLst>
             <a:ext uri="{909E8E84-426E-40DD-AFC4-6F175D3DCCD1}">
               <a14:hiddenFill xmlns:a14="http://schemas.microsoft.com/office/drawing/2010/main">

</xml_diff>

<commit_message>
MAJ 2019 Passage en classes PCAET, changement logo, ...
</commit_message>
<xml_diff>
--- a/img/contributors.pptx
+++ b/img/contributors.pptx
@@ -288,7 +288,7 @@
           <a:p>
             <a:fld id="{B27562E8-06CF-4E60-8766-CA1CD94B21AB}" type="datetimeFigureOut">
               <a:rPr lang="fr-FR" smtClean="0"/>
-              <a:t>11/07/2018</a:t>
+              <a:t>15/10/2019</a:t>
             </a:fld>
             <a:endParaRPr lang="fr-FR"/>
           </a:p>
@@ -458,7 +458,7 @@
           <a:p>
             <a:fld id="{B27562E8-06CF-4E60-8766-CA1CD94B21AB}" type="datetimeFigureOut">
               <a:rPr lang="fr-FR" smtClean="0"/>
-              <a:t>11/07/2018</a:t>
+              <a:t>15/10/2019</a:t>
             </a:fld>
             <a:endParaRPr lang="fr-FR"/>
           </a:p>
@@ -638,7 +638,7 @@
           <a:p>
             <a:fld id="{B27562E8-06CF-4E60-8766-CA1CD94B21AB}" type="datetimeFigureOut">
               <a:rPr lang="fr-FR" smtClean="0"/>
-              <a:t>11/07/2018</a:t>
+              <a:t>15/10/2019</a:t>
             </a:fld>
             <a:endParaRPr lang="fr-FR"/>
           </a:p>
@@ -808,7 +808,7 @@
           <a:p>
             <a:fld id="{B27562E8-06CF-4E60-8766-CA1CD94B21AB}" type="datetimeFigureOut">
               <a:rPr lang="fr-FR" smtClean="0"/>
-              <a:t>11/07/2018</a:t>
+              <a:t>15/10/2019</a:t>
             </a:fld>
             <a:endParaRPr lang="fr-FR"/>
           </a:p>
@@ -1054,7 +1054,7 @@
           <a:p>
             <a:fld id="{B27562E8-06CF-4E60-8766-CA1CD94B21AB}" type="datetimeFigureOut">
               <a:rPr lang="fr-FR" smtClean="0"/>
-              <a:t>11/07/2018</a:t>
+              <a:t>15/10/2019</a:t>
             </a:fld>
             <a:endParaRPr lang="fr-FR"/>
           </a:p>
@@ -1342,7 +1342,7 @@
           <a:p>
             <a:fld id="{B27562E8-06CF-4E60-8766-CA1CD94B21AB}" type="datetimeFigureOut">
               <a:rPr lang="fr-FR" smtClean="0"/>
-              <a:t>11/07/2018</a:t>
+              <a:t>15/10/2019</a:t>
             </a:fld>
             <a:endParaRPr lang="fr-FR"/>
           </a:p>
@@ -1764,7 +1764,7 @@
           <a:p>
             <a:fld id="{B27562E8-06CF-4E60-8766-CA1CD94B21AB}" type="datetimeFigureOut">
               <a:rPr lang="fr-FR" smtClean="0"/>
-              <a:t>11/07/2018</a:t>
+              <a:t>15/10/2019</a:t>
             </a:fld>
             <a:endParaRPr lang="fr-FR"/>
           </a:p>
@@ -1882,7 +1882,7 @@
           <a:p>
             <a:fld id="{B27562E8-06CF-4E60-8766-CA1CD94B21AB}" type="datetimeFigureOut">
               <a:rPr lang="fr-FR" smtClean="0"/>
-              <a:t>11/07/2018</a:t>
+              <a:t>15/10/2019</a:t>
             </a:fld>
             <a:endParaRPr lang="fr-FR"/>
           </a:p>
@@ -1977,7 +1977,7 @@
           <a:p>
             <a:fld id="{B27562E8-06CF-4E60-8766-CA1CD94B21AB}" type="datetimeFigureOut">
               <a:rPr lang="fr-FR" smtClean="0"/>
-              <a:t>11/07/2018</a:t>
+              <a:t>15/10/2019</a:t>
             </a:fld>
             <a:endParaRPr lang="fr-FR"/>
           </a:p>
@@ -2254,7 +2254,7 @@
           <a:p>
             <a:fld id="{B27562E8-06CF-4E60-8766-CA1CD94B21AB}" type="datetimeFigureOut">
               <a:rPr lang="fr-FR" smtClean="0"/>
-              <a:t>11/07/2018</a:t>
+              <a:t>15/10/2019</a:t>
             </a:fld>
             <a:endParaRPr lang="fr-FR"/>
           </a:p>
@@ -2507,7 +2507,7 @@
           <a:p>
             <a:fld id="{B27562E8-06CF-4E60-8766-CA1CD94B21AB}" type="datetimeFigureOut">
               <a:rPr lang="fr-FR" smtClean="0"/>
-              <a:t>11/07/2018</a:t>
+              <a:t>15/10/2019</a:t>
             </a:fld>
             <a:endParaRPr lang="fr-FR"/>
           </a:p>
@@ -2720,7 +2720,7 @@
           <a:p>
             <a:fld id="{B27562E8-06CF-4E60-8766-CA1CD94B21AB}" type="datetimeFigureOut">
               <a:rPr lang="fr-FR" smtClean="0"/>
-              <a:t>11/07/2018</a:t>
+              <a:t>15/10/2019</a:t>
             </a:fld>
             <a:endParaRPr lang="fr-FR"/>
           </a:p>
@@ -3282,7 +3282,7 @@
         </p:blipFill>
         <p:spPr bwMode="auto">
           <a:xfrm>
-            <a:off x="4479928" y="4437112"/>
+            <a:off x="1447972" y="4509120"/>
             <a:ext cx="1857456" cy="653791"/>
           </a:xfrm>
           <a:prstGeom prst="rect">
@@ -3323,7 +3323,7 @@
         </p:blipFill>
         <p:spPr bwMode="auto">
           <a:xfrm>
-            <a:off x="4273169" y="5100424"/>
+            <a:off x="1241213" y="5172432"/>
             <a:ext cx="2270974" cy="678815"/>
           </a:xfrm>
           <a:prstGeom prst="rect">
@@ -3362,7 +3362,7 @@
         </p:blipFill>
         <p:spPr bwMode="auto">
           <a:xfrm>
-            <a:off x="4363596" y="3429000"/>
+            <a:off x="1331640" y="3501008"/>
             <a:ext cx="2090355" cy="845820"/>
           </a:xfrm>
           <a:prstGeom prst="rect">
@@ -3372,6 +3372,129 @@
           <a:ln>
             <a:noFill/>
           </a:ln>
+          <a:extLst>
+            <a:ext uri="{909E8E84-426E-40DD-AFC4-6F175D3DCCD1}">
+              <a14:hiddenFill xmlns:a14="http://schemas.microsoft.com/office/drawing/2010/main">
+                <a:solidFill>
+                  <a:srgbClr val="FFFFFF"/>
+                </a:solidFill>
+              </a14:hiddenFill>
+            </a:ext>
+          </a:extLst>
+        </p:spPr>
+      </p:pic>
+      <p:pic>
+        <p:nvPicPr>
+          <p:cNvPr id="9" name="Picture 4" descr="C:\Users\rs\Desktop\Logo ORECA.png"/>
+          <p:cNvPicPr>
+            <a:picLocks noChangeAspect="1" noChangeArrowheads="1"/>
+          </p:cNvPicPr>
+          <p:nvPr/>
+        </p:nvPicPr>
+        <p:blipFill>
+          <a:blip r:embed="rId4" cstate="print">
+            <a:extLst>
+              <a:ext uri="{28A0092B-C50C-407E-A947-70E740481C1C}">
+                <a14:useLocalDpi xmlns:a14="http://schemas.microsoft.com/office/drawing/2010/main" val="0"/>
+              </a:ext>
+            </a:extLst>
+          </a:blip>
+          <a:srcRect/>
+          <a:stretch>
+            <a:fillRect/>
+          </a:stretch>
+        </p:blipFill>
+        <p:spPr bwMode="auto">
+          <a:xfrm>
+            <a:off x="5267172" y="4509120"/>
+            <a:ext cx="1857456" cy="653791"/>
+          </a:xfrm>
+          <a:prstGeom prst="rect">
+            <a:avLst/>
+          </a:prstGeom>
+          <a:noFill/>
+          <a:extLst>
+            <a:ext uri="{909E8E84-426E-40DD-AFC4-6F175D3DCCD1}">
+              <a14:hiddenFill xmlns:a14="http://schemas.microsoft.com/office/drawing/2010/main">
+                <a:solidFill>
+                  <a:srgbClr val="FFFFFF"/>
+                </a:solidFill>
+              </a14:hiddenFill>
+            </a:ext>
+          </a:extLst>
+        </p:spPr>
+      </p:pic>
+      <p:pic>
+        <p:nvPicPr>
+          <p:cNvPr id="10" name="Picture 5" descr="C:\Users\rs\Desktop\LogoCPERnew.png"/>
+          <p:cNvPicPr>
+            <a:picLocks noChangeAspect="1" noChangeArrowheads="1"/>
+          </p:cNvPicPr>
+          <p:nvPr/>
+        </p:nvPicPr>
+        <p:blipFill>
+          <a:blip r:embed="rId6" cstate="print">
+            <a:extLst>
+              <a:ext uri="{28A0092B-C50C-407E-A947-70E740481C1C}">
+                <a14:useLocalDpi xmlns:a14="http://schemas.microsoft.com/office/drawing/2010/main" val="0"/>
+              </a:ext>
+            </a:extLst>
+          </a:blip>
+          <a:srcRect/>
+          <a:stretch>
+            <a:fillRect/>
+          </a:stretch>
+        </p:blipFill>
+        <p:spPr bwMode="auto">
+          <a:xfrm>
+            <a:off x="5060413" y="5172432"/>
+            <a:ext cx="2270974" cy="678815"/>
+          </a:xfrm>
+          <a:prstGeom prst="rect">
+            <a:avLst/>
+          </a:prstGeom>
+          <a:noFill/>
+          <a:extLst>
+            <a:ext uri="{909E8E84-426E-40DD-AFC4-6F175D3DCCD1}">
+              <a14:hiddenFill xmlns:a14="http://schemas.microsoft.com/office/drawing/2010/main">
+                <a:solidFill>
+                  <a:srgbClr val="FFFFFF"/>
+                </a:solidFill>
+              </a14:hiddenFill>
+            </a:ext>
+          </a:extLst>
+        </p:spPr>
+      </p:pic>
+      <p:pic>
+        <p:nvPicPr>
+          <p:cNvPr id="3" name="Picture 2" descr="X:\LOGOTHEQUE\LOGOS_ATMOSUD\LOGO_2019\Logo Atmosud Inspirer OK.png"/>
+          <p:cNvPicPr>
+            <a:picLocks noChangeAspect="1" noChangeArrowheads="1"/>
+          </p:cNvPicPr>
+          <p:nvPr/>
+        </p:nvPicPr>
+        <p:blipFill>
+          <a:blip r:embed="rId8" cstate="print">
+            <a:extLst>
+              <a:ext uri="{28A0092B-C50C-407E-A947-70E740481C1C}">
+                <a14:useLocalDpi xmlns:a14="http://schemas.microsoft.com/office/drawing/2010/main" val="0"/>
+              </a:ext>
+            </a:extLst>
+          </a:blip>
+          <a:srcRect/>
+          <a:stretch>
+            <a:fillRect/>
+          </a:stretch>
+        </p:blipFill>
+        <p:spPr bwMode="auto">
+          <a:xfrm>
+            <a:off x="5134916" y="3503864"/>
+            <a:ext cx="2121401" cy="846000"/>
+          </a:xfrm>
+          <a:prstGeom prst="rect">
+            <a:avLst/>
+          </a:prstGeom>
+          <a:noFill/>
           <a:extLst>
             <a:ext uri="{909E8E84-426E-40DD-AFC4-6F175D3DCCD1}">
               <a14:hiddenFill xmlns:a14="http://schemas.microsoft.com/office/drawing/2010/main">

</xml_diff>